<commit_message>
blue logo since now
</commit_message>
<xml_diff>
--- a/images/Logositeweb.pptx
+++ b/images/Logositeweb.pptx
@@ -104,6 +104,11 @@
       </a:defRPr>
     </a:lvl9pPr>
   </p:defaultTextStyle>
+  <p:extLst>
+    <p:ext uri="{EFAFB233-063F-42B5-8137-9DF3F51BA10A}">
+      <p15:sldGuideLst xmlns:p15="http://schemas.microsoft.com/office/powerpoint/2012/main"/>
+    </p:ext>
+  </p:extLst>
 </p:presentation>
 </file>
 
@@ -3307,6 +3312,14 @@
 <file path=ppt/slides/slide1.xml><?xml version="1.0" encoding="utf-8"?>
 <p:sld xmlns:a="http://schemas.openxmlformats.org/drawingml/2006/main" xmlns:r="http://schemas.openxmlformats.org/officeDocument/2006/relationships" xmlns:p="http://schemas.openxmlformats.org/presentationml/2006/main">
   <p:cSld>
+    <p:bg>
+      <p:bgPr>
+        <a:solidFill>
+          <a:srgbClr val="007BFF"/>
+        </a:solidFill>
+        <a:effectLst/>
+      </p:bgPr>
+    </p:bg>
     <p:spTree>
       <p:nvGrpSpPr>
         <p:cNvPr id="1" name=""/>
@@ -3370,6 +3383,9 @@
           <a:p>
             <a:r>
               <a:rPr lang="fr-FR" sz="19900" dirty="0">
+                <a:solidFill>
+                  <a:schemeClr val="bg1"/>
+                </a:solidFill>
                 <a:latin typeface="Consolas" panose="020B0609020204030204" pitchFamily="49" charset="0"/>
               </a:rPr>
               <a:t>&lt;/&gt;</a:t>

</xml_diff>